<commit_message>
Accidentally overwrote Class Nine slides with Class Ten. Reverted.
</commit_message>
<xml_diff>
--- a/slides/classnine/slides.pptx
+++ b/slides/classnine/slides.pptx
@@ -5,7 +5,7 @@
     <p:sldMasterId id="2147483660" r:id="rId1"/>
   </p:sldMasterIdLst>
   <p:notesMasterIdLst>
-    <p:notesMasterId r:id="rId10"/>
+    <p:notesMasterId r:id="rId20"/>
   </p:notesMasterIdLst>
   <p:sldIdLst>
     <p:sldId id="256" r:id="rId2"/>
@@ -14,8 +14,18 @@
     <p:sldId id="258" r:id="rId5"/>
     <p:sldId id="259" r:id="rId6"/>
     <p:sldId id="312" r:id="rId7"/>
-    <p:sldId id="399" r:id="rId8"/>
-    <p:sldId id="267" r:id="rId9"/>
+    <p:sldId id="400" r:id="rId8"/>
+    <p:sldId id="401" r:id="rId9"/>
+    <p:sldId id="399" r:id="rId10"/>
+    <p:sldId id="402" r:id="rId11"/>
+    <p:sldId id="403" r:id="rId12"/>
+    <p:sldId id="404" r:id="rId13"/>
+    <p:sldId id="407" r:id="rId14"/>
+    <p:sldId id="405" r:id="rId15"/>
+    <p:sldId id="406" r:id="rId16"/>
+    <p:sldId id="408" r:id="rId17"/>
+    <p:sldId id="409" r:id="rId18"/>
+    <p:sldId id="267" r:id="rId19"/>
   </p:sldIdLst>
   <p:sldSz cx="9144000" cy="6858000" type="screen4x3"/>
   <p:notesSz cx="6858000" cy="9144000"/>
@@ -555,6 +565,90 @@
 </p:notes>
 </file>
 
+<file path=ppt/notesSlides/notesSlide10.xml><?xml version="1.0" encoding="utf-8"?>
+<p:notes xmlns:a="http://schemas.openxmlformats.org/drawingml/2006/main" xmlns:r="http://schemas.openxmlformats.org/officeDocument/2006/relationships" xmlns:p="http://schemas.openxmlformats.org/presentationml/2006/main">
+  <p:cSld>
+    <p:spTree>
+      <p:nvGrpSpPr>
+        <p:cNvPr id="1" name=""/>
+        <p:cNvGrpSpPr/>
+        <p:nvPr/>
+      </p:nvGrpSpPr>
+      <p:grpSpPr>
+        <a:xfrm>
+          <a:off x="0" y="0"/>
+          <a:ext cx="0" cy="0"/>
+          <a:chOff x="0" y="0"/>
+          <a:chExt cx="0" cy="0"/>
+        </a:xfrm>
+      </p:grpSpPr>
+      <p:sp>
+        <p:nvSpPr>
+          <p:cNvPr id="2" name="Slide Image Placeholder 1"/>
+          <p:cNvSpPr>
+            <a:spLocks noGrp="1" noRot="1" noChangeAspect="1"/>
+          </p:cNvSpPr>
+          <p:nvPr>
+            <p:ph type="sldImg"/>
+          </p:nvPr>
+        </p:nvSpPr>
+        <p:spPr/>
+      </p:sp>
+      <p:sp>
+        <p:nvSpPr>
+          <p:cNvPr id="3" name="Notes Placeholder 2"/>
+          <p:cNvSpPr>
+            <a:spLocks noGrp="1"/>
+          </p:cNvSpPr>
+          <p:nvPr>
+            <p:ph type="body" idx="1"/>
+          </p:nvPr>
+        </p:nvSpPr>
+        <p:spPr/>
+        <p:txBody>
+          <a:bodyPr/>
+          <a:lstStyle/>
+          <a:p>
+            <a:endParaRPr lang="en-US" dirty="0"/>
+          </a:p>
+        </p:txBody>
+      </p:sp>
+      <p:sp>
+        <p:nvSpPr>
+          <p:cNvPr id="4" name="Slide Number Placeholder 3"/>
+          <p:cNvSpPr>
+            <a:spLocks noGrp="1"/>
+          </p:cNvSpPr>
+          <p:nvPr>
+            <p:ph type="sldNum" sz="quarter" idx="10"/>
+          </p:nvPr>
+        </p:nvSpPr>
+        <p:spPr/>
+        <p:txBody>
+          <a:bodyPr/>
+          <a:lstStyle/>
+          <a:p>
+            <a:fld id="{F0AB357A-3C6D-9E43-AB07-807CDFEA83A0}" type="slidenum">
+              <a:rPr lang="en-US" smtClean="0"/>
+              <a:t>18</a:t>
+            </a:fld>
+            <a:endParaRPr lang="en-US"/>
+          </a:p>
+        </p:txBody>
+      </p:sp>
+    </p:spTree>
+    <p:extLst>
+      <p:ext uri="{BB962C8B-B14F-4D97-AF65-F5344CB8AC3E}">
+        <p14:creationId xmlns:p14="http://schemas.microsoft.com/office/powerpoint/2010/main" val="2675589082"/>
+      </p:ext>
+    </p:extLst>
+  </p:cSld>
+  <p:clrMapOvr>
+    <a:masterClrMapping/>
+  </p:clrMapOvr>
+</p:notes>
+</file>
+
 <file path=ppt/notesSlides/notesSlide2.xml><?xml version="1.0" encoding="utf-8"?>
 <p:notes xmlns:a="http://schemas.openxmlformats.org/drawingml/2006/main" xmlns:r="http://schemas.openxmlformats.org/officeDocument/2006/relationships" xmlns:p="http://schemas.openxmlformats.org/presentationml/2006/main">
   <p:cSld>
@@ -871,6 +965,10 @@
           <a:bodyPr/>
           <a:lstStyle/>
           <a:p>
+            <a:r>
+              <a:rPr lang="en-US" dirty="0" smtClean="0"/>
+              <a:t>Break – 8 minutes</a:t>
+            </a:r>
             <a:endParaRPr lang="en-US" dirty="0"/>
           </a:p>
         </p:txBody>
@@ -901,7 +999,423 @@
     </p:spTree>
     <p:extLst>
       <p:ext uri="{BB962C8B-B14F-4D97-AF65-F5344CB8AC3E}">
-        <p14:creationId xmlns:p14="http://schemas.microsoft.com/office/powerpoint/2010/main" val="2675589082"/>
+        <p14:creationId xmlns:p14="http://schemas.microsoft.com/office/powerpoint/2010/main" val="2491357436"/>
+      </p:ext>
+    </p:extLst>
+  </p:cSld>
+  <p:clrMapOvr>
+    <a:masterClrMapping/>
+  </p:clrMapOvr>
+</p:notes>
+</file>
+
+<file path=ppt/notesSlides/notesSlide6.xml><?xml version="1.0" encoding="utf-8"?>
+<p:notes xmlns:a="http://schemas.openxmlformats.org/drawingml/2006/main" xmlns:r="http://schemas.openxmlformats.org/officeDocument/2006/relationships" xmlns:p="http://schemas.openxmlformats.org/presentationml/2006/main">
+  <p:cSld>
+    <p:spTree>
+      <p:nvGrpSpPr>
+        <p:cNvPr id="1" name=""/>
+        <p:cNvGrpSpPr/>
+        <p:nvPr/>
+      </p:nvGrpSpPr>
+      <p:grpSpPr>
+        <a:xfrm>
+          <a:off x="0" y="0"/>
+          <a:ext cx="0" cy="0"/>
+          <a:chOff x="0" y="0"/>
+          <a:chExt cx="0" cy="0"/>
+        </a:xfrm>
+      </p:grpSpPr>
+      <p:sp>
+        <p:nvSpPr>
+          <p:cNvPr id="2" name="Slide Image Placeholder 1"/>
+          <p:cNvSpPr>
+            <a:spLocks noGrp="1" noRot="1" noChangeAspect="1"/>
+          </p:cNvSpPr>
+          <p:nvPr>
+            <p:ph type="sldImg"/>
+          </p:nvPr>
+        </p:nvSpPr>
+        <p:spPr/>
+      </p:sp>
+      <p:sp>
+        <p:nvSpPr>
+          <p:cNvPr id="3" name="Notes Placeholder 2"/>
+          <p:cNvSpPr>
+            <a:spLocks noGrp="1"/>
+          </p:cNvSpPr>
+          <p:nvPr>
+            <p:ph type="body" idx="1"/>
+          </p:nvPr>
+        </p:nvSpPr>
+        <p:spPr/>
+        <p:txBody>
+          <a:bodyPr/>
+          <a:lstStyle/>
+          <a:p>
+            <a:r>
+              <a:rPr lang="en-US" dirty="0" smtClean="0"/>
+              <a:t>http://</a:t>
+            </a:r>
+            <a:r>
+              <a:rPr lang="en-US" dirty="0" err="1" smtClean="0"/>
+              <a:t>www.flickr.com</a:t>
+            </a:r>
+            <a:r>
+              <a:rPr lang="en-US" dirty="0" smtClean="0"/>
+              <a:t>/photos/</a:t>
+            </a:r>
+            <a:r>
+              <a:rPr lang="en-US" dirty="0" err="1" smtClean="0"/>
+              <a:t>uaeincredible</a:t>
+            </a:r>
+            <a:r>
+              <a:rPr lang="en-US" dirty="0" smtClean="0"/>
+              <a:t>/231011361/</a:t>
+            </a:r>
+            <a:endParaRPr lang="en-US" dirty="0"/>
+          </a:p>
+        </p:txBody>
+      </p:sp>
+      <p:sp>
+        <p:nvSpPr>
+          <p:cNvPr id="4" name="Slide Number Placeholder 3"/>
+          <p:cNvSpPr>
+            <a:spLocks noGrp="1"/>
+          </p:cNvSpPr>
+          <p:nvPr>
+            <p:ph type="sldNum" sz="quarter" idx="10"/>
+          </p:nvPr>
+        </p:nvSpPr>
+        <p:spPr/>
+        <p:txBody>
+          <a:bodyPr/>
+          <a:lstStyle/>
+          <a:p>
+            <a:fld id="{F0AB357A-3C6D-9E43-AB07-807CDFEA83A0}" type="slidenum">
+              <a:rPr lang="en-US" smtClean="0"/>
+              <a:t>11</a:t>
+            </a:fld>
+            <a:endParaRPr lang="en-US"/>
+          </a:p>
+        </p:txBody>
+      </p:sp>
+    </p:spTree>
+    <p:extLst>
+      <p:ext uri="{BB962C8B-B14F-4D97-AF65-F5344CB8AC3E}">
+        <p14:creationId xmlns:p14="http://schemas.microsoft.com/office/powerpoint/2010/main" val="233649276"/>
+      </p:ext>
+    </p:extLst>
+  </p:cSld>
+  <p:clrMapOvr>
+    <a:masterClrMapping/>
+  </p:clrMapOvr>
+</p:notes>
+</file>
+
+<file path=ppt/notesSlides/notesSlide7.xml><?xml version="1.0" encoding="utf-8"?>
+<p:notes xmlns:a="http://schemas.openxmlformats.org/drawingml/2006/main" xmlns:r="http://schemas.openxmlformats.org/officeDocument/2006/relationships" xmlns:p="http://schemas.openxmlformats.org/presentationml/2006/main">
+  <p:cSld>
+    <p:spTree>
+      <p:nvGrpSpPr>
+        <p:cNvPr id="1" name=""/>
+        <p:cNvGrpSpPr/>
+        <p:nvPr/>
+      </p:nvGrpSpPr>
+      <p:grpSpPr>
+        <a:xfrm>
+          <a:off x="0" y="0"/>
+          <a:ext cx="0" cy="0"/>
+          <a:chOff x="0" y="0"/>
+          <a:chExt cx="0" cy="0"/>
+        </a:xfrm>
+      </p:grpSpPr>
+      <p:sp>
+        <p:nvSpPr>
+          <p:cNvPr id="2" name="Slide Image Placeholder 1"/>
+          <p:cNvSpPr>
+            <a:spLocks noGrp="1" noRot="1" noChangeAspect="1"/>
+          </p:cNvSpPr>
+          <p:nvPr>
+            <p:ph type="sldImg"/>
+          </p:nvPr>
+        </p:nvSpPr>
+        <p:spPr/>
+      </p:sp>
+      <p:sp>
+        <p:nvSpPr>
+          <p:cNvPr id="3" name="Notes Placeholder 2"/>
+          <p:cNvSpPr>
+            <a:spLocks noGrp="1"/>
+          </p:cNvSpPr>
+          <p:nvPr>
+            <p:ph type="body" idx="1"/>
+          </p:nvPr>
+        </p:nvSpPr>
+        <p:spPr/>
+        <p:txBody>
+          <a:bodyPr/>
+          <a:lstStyle/>
+          <a:p>
+            <a:r>
+              <a:rPr lang="en-US" dirty="0" smtClean="0"/>
+              <a:t>http://</a:t>
+            </a:r>
+            <a:r>
+              <a:rPr lang="en-US" dirty="0" err="1" smtClean="0"/>
+              <a:t>www.flickr.com</a:t>
+            </a:r>
+            <a:r>
+              <a:rPr lang="en-US" dirty="0" smtClean="0"/>
+              <a:t>/photos/</a:t>
+            </a:r>
+            <a:r>
+              <a:rPr lang="en-US" dirty="0" err="1" smtClean="0"/>
+              <a:t>uckhet</a:t>
+            </a:r>
+            <a:r>
+              <a:rPr lang="en-US" dirty="0" smtClean="0"/>
+              <a:t>/368594481/</a:t>
+            </a:r>
+            <a:endParaRPr lang="en-US" dirty="0"/>
+          </a:p>
+        </p:txBody>
+      </p:sp>
+      <p:sp>
+        <p:nvSpPr>
+          <p:cNvPr id="4" name="Slide Number Placeholder 3"/>
+          <p:cNvSpPr>
+            <a:spLocks noGrp="1"/>
+          </p:cNvSpPr>
+          <p:nvPr>
+            <p:ph type="sldNum" sz="quarter" idx="10"/>
+          </p:nvPr>
+        </p:nvSpPr>
+        <p:spPr/>
+        <p:txBody>
+          <a:bodyPr/>
+          <a:lstStyle/>
+          <a:p>
+            <a:fld id="{F0AB357A-3C6D-9E43-AB07-807CDFEA83A0}" type="slidenum">
+              <a:rPr lang="en-US" smtClean="0"/>
+              <a:t>12</a:t>
+            </a:fld>
+            <a:endParaRPr lang="en-US"/>
+          </a:p>
+        </p:txBody>
+      </p:sp>
+    </p:spTree>
+    <p:extLst>
+      <p:ext uri="{BB962C8B-B14F-4D97-AF65-F5344CB8AC3E}">
+        <p14:creationId xmlns:p14="http://schemas.microsoft.com/office/powerpoint/2010/main" val="1734743239"/>
+      </p:ext>
+    </p:extLst>
+  </p:cSld>
+  <p:clrMapOvr>
+    <a:masterClrMapping/>
+  </p:clrMapOvr>
+</p:notes>
+</file>
+
+<file path=ppt/notesSlides/notesSlide8.xml><?xml version="1.0" encoding="utf-8"?>
+<p:notes xmlns:a="http://schemas.openxmlformats.org/drawingml/2006/main" xmlns:r="http://schemas.openxmlformats.org/officeDocument/2006/relationships" xmlns:p="http://schemas.openxmlformats.org/presentationml/2006/main">
+  <p:cSld>
+    <p:spTree>
+      <p:nvGrpSpPr>
+        <p:cNvPr id="1" name=""/>
+        <p:cNvGrpSpPr/>
+        <p:nvPr/>
+      </p:nvGrpSpPr>
+      <p:grpSpPr>
+        <a:xfrm>
+          <a:off x="0" y="0"/>
+          <a:ext cx="0" cy="0"/>
+          <a:chOff x="0" y="0"/>
+          <a:chExt cx="0" cy="0"/>
+        </a:xfrm>
+      </p:grpSpPr>
+      <p:sp>
+        <p:nvSpPr>
+          <p:cNvPr id="2" name="Slide Image Placeholder 1"/>
+          <p:cNvSpPr>
+            <a:spLocks noGrp="1" noRot="1" noChangeAspect="1"/>
+          </p:cNvSpPr>
+          <p:nvPr>
+            <p:ph type="sldImg"/>
+          </p:nvPr>
+        </p:nvSpPr>
+        <p:spPr/>
+      </p:sp>
+      <p:sp>
+        <p:nvSpPr>
+          <p:cNvPr id="3" name="Notes Placeholder 2"/>
+          <p:cNvSpPr>
+            <a:spLocks noGrp="1"/>
+          </p:cNvSpPr>
+          <p:nvPr>
+            <p:ph type="body" idx="1"/>
+          </p:nvPr>
+        </p:nvSpPr>
+        <p:spPr/>
+        <p:txBody>
+          <a:bodyPr/>
+          <a:lstStyle/>
+          <a:p>
+            <a:r>
+              <a:rPr lang="en-US" dirty="0" smtClean="0"/>
+              <a:t>http://</a:t>
+            </a:r>
+            <a:r>
+              <a:rPr lang="en-US" dirty="0" err="1" smtClean="0"/>
+              <a:t>www.flickr.com</a:t>
+            </a:r>
+            <a:r>
+              <a:rPr lang="en-US" dirty="0" smtClean="0"/>
+              <a:t>/photos/</a:t>
+            </a:r>
+            <a:r>
+              <a:rPr lang="en-US" dirty="0" err="1" smtClean="0"/>
+              <a:t>jkownacki</a:t>
+            </a:r>
+            <a:r>
+              <a:rPr lang="en-US" dirty="0" smtClean="0"/>
+              <a:t>/4067668954/</a:t>
+            </a:r>
+            <a:endParaRPr lang="en-US" dirty="0"/>
+          </a:p>
+        </p:txBody>
+      </p:sp>
+      <p:sp>
+        <p:nvSpPr>
+          <p:cNvPr id="4" name="Slide Number Placeholder 3"/>
+          <p:cNvSpPr>
+            <a:spLocks noGrp="1"/>
+          </p:cNvSpPr>
+          <p:nvPr>
+            <p:ph type="sldNum" sz="quarter" idx="10"/>
+          </p:nvPr>
+        </p:nvSpPr>
+        <p:spPr/>
+        <p:txBody>
+          <a:bodyPr/>
+          <a:lstStyle/>
+          <a:p>
+            <a:fld id="{F0AB357A-3C6D-9E43-AB07-807CDFEA83A0}" type="slidenum">
+              <a:rPr lang="en-US" smtClean="0"/>
+              <a:t>14</a:t>
+            </a:fld>
+            <a:endParaRPr lang="en-US"/>
+          </a:p>
+        </p:txBody>
+      </p:sp>
+    </p:spTree>
+    <p:extLst>
+      <p:ext uri="{BB962C8B-B14F-4D97-AF65-F5344CB8AC3E}">
+        <p14:creationId xmlns:p14="http://schemas.microsoft.com/office/powerpoint/2010/main" val="2087792552"/>
+      </p:ext>
+    </p:extLst>
+  </p:cSld>
+  <p:clrMapOvr>
+    <a:masterClrMapping/>
+  </p:clrMapOvr>
+</p:notes>
+</file>
+
+<file path=ppt/notesSlides/notesSlide9.xml><?xml version="1.0" encoding="utf-8"?>
+<p:notes xmlns:a="http://schemas.openxmlformats.org/drawingml/2006/main" xmlns:r="http://schemas.openxmlformats.org/officeDocument/2006/relationships" xmlns:p="http://schemas.openxmlformats.org/presentationml/2006/main">
+  <p:cSld>
+    <p:spTree>
+      <p:nvGrpSpPr>
+        <p:cNvPr id="1" name=""/>
+        <p:cNvGrpSpPr/>
+        <p:nvPr/>
+      </p:nvGrpSpPr>
+      <p:grpSpPr>
+        <a:xfrm>
+          <a:off x="0" y="0"/>
+          <a:ext cx="0" cy="0"/>
+          <a:chOff x="0" y="0"/>
+          <a:chExt cx="0" cy="0"/>
+        </a:xfrm>
+      </p:grpSpPr>
+      <p:sp>
+        <p:nvSpPr>
+          <p:cNvPr id="2" name="Slide Image Placeholder 1"/>
+          <p:cNvSpPr>
+            <a:spLocks noGrp="1" noRot="1" noChangeAspect="1"/>
+          </p:cNvSpPr>
+          <p:nvPr>
+            <p:ph type="sldImg"/>
+          </p:nvPr>
+        </p:nvSpPr>
+        <p:spPr/>
+      </p:sp>
+      <p:sp>
+        <p:nvSpPr>
+          <p:cNvPr id="3" name="Notes Placeholder 2"/>
+          <p:cNvSpPr>
+            <a:spLocks noGrp="1"/>
+          </p:cNvSpPr>
+          <p:nvPr>
+            <p:ph type="body" idx="1"/>
+          </p:nvPr>
+        </p:nvSpPr>
+        <p:spPr/>
+        <p:txBody>
+          <a:bodyPr/>
+          <a:lstStyle/>
+          <a:p>
+            <a:r>
+              <a:rPr lang="en-US" dirty="0" smtClean="0"/>
+              <a:t>http://</a:t>
+            </a:r>
+            <a:r>
+              <a:rPr lang="en-US" dirty="0" err="1" smtClean="0"/>
+              <a:t>www.flickr.com</a:t>
+            </a:r>
+            <a:r>
+              <a:rPr lang="en-US" dirty="0" smtClean="0"/>
+              <a:t>/photos/</a:t>
+            </a:r>
+            <a:r>
+              <a:rPr lang="en-US" dirty="0" err="1" smtClean="0"/>
+              <a:t>nhall</a:t>
+            </a:r>
+            <a:r>
+              <a:rPr lang="en-US" dirty="0" smtClean="0"/>
+              <a:t>/477025209/</a:t>
+            </a:r>
+            <a:endParaRPr lang="en-US" dirty="0"/>
+          </a:p>
+        </p:txBody>
+      </p:sp>
+      <p:sp>
+        <p:nvSpPr>
+          <p:cNvPr id="4" name="Slide Number Placeholder 3"/>
+          <p:cNvSpPr>
+            <a:spLocks noGrp="1"/>
+          </p:cNvSpPr>
+          <p:nvPr>
+            <p:ph type="sldNum" sz="quarter" idx="10"/>
+          </p:nvPr>
+        </p:nvSpPr>
+        <p:spPr/>
+        <p:txBody>
+          <a:bodyPr/>
+          <a:lstStyle/>
+          <a:p>
+            <a:fld id="{F0AB357A-3C6D-9E43-AB07-807CDFEA83A0}" type="slidenum">
+              <a:rPr lang="en-US" smtClean="0"/>
+              <a:t>17</a:t>
+            </a:fld>
+            <a:endParaRPr lang="en-US"/>
+          </a:p>
+        </p:txBody>
+      </p:sp>
+    </p:spTree>
+    <p:extLst>
+      <p:ext uri="{BB962C8B-B14F-4D97-AF65-F5344CB8AC3E}">
+        <p14:creationId xmlns:p14="http://schemas.microsoft.com/office/powerpoint/2010/main" val="2088662620"/>
       </p:ext>
     </p:extLst>
   </p:cSld>
@@ -6113,11 +6627,7 @@
           <a:p>
             <a:r>
               <a:rPr lang="en-US" dirty="0" smtClean="0"/>
-              <a:t>Class </a:t>
-            </a:r>
-            <a:r>
-              <a:rPr lang="en-US" dirty="0" smtClean="0"/>
-              <a:t>Ten</a:t>
+              <a:t>Class Nine</a:t>
             </a:r>
             <a:endParaRPr lang="en-US" dirty="0"/>
           </a:p>
@@ -6140,9 +6650,8 @@
           <a:p>
             <a:r>
               <a:rPr lang="en-US" dirty="0"/>
-              <a:t>Smart Navigation</a:t>
-            </a:r>
-            <a:endParaRPr lang="en-US" dirty="0"/>
+              <a:t>Designing With Color</a:t>
+            </a:r>
           </a:p>
         </p:txBody>
       </p:sp>
@@ -6150,6 +6659,936 @@
     <p:extLst>
       <p:ext uri="{BB962C8B-B14F-4D97-AF65-F5344CB8AC3E}">
         <p14:creationId xmlns:p14="http://schemas.microsoft.com/office/powerpoint/2010/main" val="855943840"/>
+      </p:ext>
+    </p:extLst>
+  </p:cSld>
+  <p:clrMapOvr>
+    <a:masterClrMapping/>
+  </p:clrMapOvr>
+  <p:timing>
+    <p:tnLst>
+      <p:par>
+        <p:cTn xmlns:p14="http://schemas.microsoft.com/office/powerpoint/2010/main" id="1" dur="indefinite" restart="never" nodeType="tmRoot"/>
+      </p:par>
+    </p:tnLst>
+  </p:timing>
+</p:sld>
+</file>
+
+<file path=ppt/slides/slide10.xml><?xml version="1.0" encoding="utf-8"?>
+<p:sld xmlns:a="http://schemas.openxmlformats.org/drawingml/2006/main" xmlns:r="http://schemas.openxmlformats.org/officeDocument/2006/relationships" xmlns:p="http://schemas.openxmlformats.org/presentationml/2006/main">
+  <p:cSld>
+    <p:spTree>
+      <p:nvGrpSpPr>
+        <p:cNvPr id="1" name=""/>
+        <p:cNvGrpSpPr/>
+        <p:nvPr/>
+      </p:nvGrpSpPr>
+      <p:grpSpPr>
+        <a:xfrm>
+          <a:off x="0" y="0"/>
+          <a:ext cx="0" cy="0"/>
+          <a:chOff x="0" y="0"/>
+          <a:chExt cx="0" cy="0"/>
+        </a:xfrm>
+      </p:grpSpPr>
+      <p:sp>
+        <p:nvSpPr>
+          <p:cNvPr id="2" name="Title 1"/>
+          <p:cNvSpPr>
+            <a:spLocks noGrp="1"/>
+          </p:cNvSpPr>
+          <p:nvPr>
+            <p:ph type="title"/>
+          </p:nvPr>
+        </p:nvSpPr>
+        <p:spPr/>
+        <p:txBody>
+          <a:bodyPr/>
+          <a:lstStyle/>
+          <a:p>
+            <a:r>
+              <a:rPr lang="en-US" dirty="0" smtClean="0"/>
+              <a:t>9Fools?</a:t>
+            </a:r>
+            <a:endParaRPr lang="en-US" dirty="0"/>
+          </a:p>
+        </p:txBody>
+      </p:sp>
+      <p:pic>
+        <p:nvPicPr>
+          <p:cNvPr id="6" name="Content Placeholder 5" descr="How do I join 9rules?.jpg"/>
+          <p:cNvPicPr>
+            <a:picLocks noGrp="1" noChangeAspect="1"/>
+          </p:cNvPicPr>
+          <p:nvPr>
+            <p:ph idx="1"/>
+          </p:nvPr>
+        </p:nvPicPr>
+        <p:blipFill>
+          <a:blip r:embed="rId2">
+            <a:extLst>
+              <a:ext uri="{28A0092B-C50C-407E-A947-70E740481C1C}">
+                <a14:useLocalDpi xmlns:a14="http://schemas.microsoft.com/office/drawing/2010/main" val="0"/>
+              </a:ext>
+            </a:extLst>
+          </a:blip>
+          <a:srcRect l="-11275" r="-11275"/>
+          <a:stretch>
+            <a:fillRect/>
+          </a:stretch>
+        </p:blipFill>
+        <p:spPr/>
+      </p:pic>
+    </p:spTree>
+    <p:extLst>
+      <p:ext uri="{BB962C8B-B14F-4D97-AF65-F5344CB8AC3E}">
+        <p14:creationId xmlns:p14="http://schemas.microsoft.com/office/powerpoint/2010/main" val="2405412717"/>
+      </p:ext>
+    </p:extLst>
+  </p:cSld>
+  <p:clrMapOvr>
+    <a:masterClrMapping/>
+  </p:clrMapOvr>
+</p:sld>
+</file>
+
+<file path=ppt/slides/slide11.xml><?xml version="1.0" encoding="utf-8"?>
+<p:sld xmlns:a="http://schemas.openxmlformats.org/drawingml/2006/main" xmlns:r="http://schemas.openxmlformats.org/officeDocument/2006/relationships" xmlns:p="http://schemas.openxmlformats.org/presentationml/2006/main">
+  <p:cSld>
+    <p:spTree>
+      <p:nvGrpSpPr>
+        <p:cNvPr id="1" name=""/>
+        <p:cNvGrpSpPr/>
+        <p:nvPr/>
+      </p:nvGrpSpPr>
+      <p:grpSpPr>
+        <a:xfrm>
+          <a:off x="0" y="0"/>
+          <a:ext cx="0" cy="0"/>
+          <a:chOff x="0" y="0"/>
+          <a:chExt cx="0" cy="0"/>
+        </a:xfrm>
+      </p:grpSpPr>
+      <p:sp>
+        <p:nvSpPr>
+          <p:cNvPr id="2" name="Title 1"/>
+          <p:cNvSpPr>
+            <a:spLocks noGrp="1"/>
+          </p:cNvSpPr>
+          <p:nvPr>
+            <p:ph type="title"/>
+          </p:nvPr>
+        </p:nvSpPr>
+        <p:spPr/>
+        <p:txBody>
+          <a:bodyPr/>
+          <a:lstStyle/>
+          <a:p>
+            <a:r>
+              <a:rPr lang="en-US" dirty="0" smtClean="0"/>
+              <a:t>Color</a:t>
+            </a:r>
+            <a:endParaRPr lang="en-US" dirty="0"/>
+          </a:p>
+        </p:txBody>
+      </p:sp>
+      <p:pic>
+        <p:nvPicPr>
+          <p:cNvPr id="6" name="Content Placeholder 5"/>
+          <p:cNvPicPr>
+            <a:picLocks noGrp="1" noChangeAspect="1"/>
+          </p:cNvPicPr>
+          <p:nvPr>
+            <p:ph sz="quarter" idx="13"/>
+          </p:nvPr>
+        </p:nvPicPr>
+        <p:blipFill>
+          <a:blip r:embed="rId3"/>
+          <a:srcRect l="20373" r="20373"/>
+          <a:stretch>
+            <a:fillRect/>
+          </a:stretch>
+        </p:blipFill>
+        <p:spPr/>
+      </p:pic>
+      <p:sp>
+        <p:nvSpPr>
+          <p:cNvPr id="5" name="Content Placeholder 4"/>
+          <p:cNvSpPr>
+            <a:spLocks noGrp="1"/>
+          </p:cNvSpPr>
+          <p:nvPr>
+            <p:ph sz="quarter" idx="14"/>
+          </p:nvPr>
+        </p:nvSpPr>
+        <p:spPr/>
+        <p:txBody>
+          <a:bodyPr/>
+          <a:lstStyle/>
+          <a:p>
+            <a:r>
+              <a:rPr lang="en-US" dirty="0" smtClean="0"/>
+              <a:t>Creates emotion</a:t>
+            </a:r>
+          </a:p>
+          <a:p>
+            <a:pPr lvl="1"/>
+            <a:r>
+              <a:rPr lang="en-US" dirty="0" smtClean="0"/>
+              <a:t>Red = excitement</a:t>
+            </a:r>
+          </a:p>
+          <a:p>
+            <a:pPr lvl="1"/>
+            <a:r>
+              <a:rPr lang="en-US" dirty="0" smtClean="0"/>
+              <a:t>Blue = comfort</a:t>
+            </a:r>
+          </a:p>
+          <a:p>
+            <a:pPr lvl="1"/>
+            <a:r>
+              <a:rPr lang="en-US" dirty="0" smtClean="0"/>
+              <a:t>Purple = dignity</a:t>
+            </a:r>
+          </a:p>
+          <a:p>
+            <a:r>
+              <a:rPr lang="en-US" dirty="0" smtClean="0"/>
+              <a:t>No different than other artistic media</a:t>
+            </a:r>
+          </a:p>
+        </p:txBody>
+      </p:sp>
+    </p:spTree>
+    <p:extLst>
+      <p:ext uri="{BB962C8B-B14F-4D97-AF65-F5344CB8AC3E}">
+        <p14:creationId xmlns:p14="http://schemas.microsoft.com/office/powerpoint/2010/main" val="3695598094"/>
+      </p:ext>
+    </p:extLst>
+  </p:cSld>
+  <p:clrMapOvr>
+    <a:masterClrMapping/>
+  </p:clrMapOvr>
+</p:sld>
+</file>
+
+<file path=ppt/slides/slide12.xml><?xml version="1.0" encoding="utf-8"?>
+<p:sld xmlns:a="http://schemas.openxmlformats.org/drawingml/2006/main" xmlns:r="http://schemas.openxmlformats.org/officeDocument/2006/relationships" xmlns:p="http://schemas.openxmlformats.org/presentationml/2006/main">
+  <p:cSld>
+    <p:spTree>
+      <p:nvGrpSpPr>
+        <p:cNvPr id="1" name=""/>
+        <p:cNvGrpSpPr/>
+        <p:nvPr/>
+      </p:nvGrpSpPr>
+      <p:grpSpPr>
+        <a:xfrm>
+          <a:off x="0" y="0"/>
+          <a:ext cx="0" cy="0"/>
+          <a:chOff x="0" y="0"/>
+          <a:chExt cx="0" cy="0"/>
+        </a:xfrm>
+      </p:grpSpPr>
+      <p:sp>
+        <p:nvSpPr>
+          <p:cNvPr id="2" name="Title 1"/>
+          <p:cNvSpPr>
+            <a:spLocks noGrp="1"/>
+          </p:cNvSpPr>
+          <p:nvPr>
+            <p:ph type="title"/>
+          </p:nvPr>
+        </p:nvSpPr>
+        <p:spPr/>
+        <p:txBody>
+          <a:bodyPr/>
+          <a:lstStyle/>
+          <a:p>
+            <a:r>
+              <a:rPr lang="en-US" dirty="0" smtClean="0"/>
+              <a:t>Color Wheel</a:t>
+            </a:r>
+            <a:endParaRPr lang="en-US" dirty="0"/>
+          </a:p>
+        </p:txBody>
+      </p:sp>
+      <p:pic>
+        <p:nvPicPr>
+          <p:cNvPr id="5" name="Content Placeholder 4"/>
+          <p:cNvPicPr>
+            <a:picLocks noGrp="1" noChangeAspect="1"/>
+          </p:cNvPicPr>
+          <p:nvPr>
+            <p:ph sz="quarter" idx="13"/>
+          </p:nvPr>
+        </p:nvPicPr>
+        <p:blipFill rotWithShape="1">
+          <a:blip r:embed="rId3"/>
+          <a:srcRect l="25507" t="44" r="11632" b="-44"/>
+          <a:stretch/>
+        </p:blipFill>
+        <p:spPr>
+          <a:xfrm>
+            <a:off x="1298575" y="2120900"/>
+            <a:ext cx="3200400" cy="3603625"/>
+          </a:xfrm>
+        </p:spPr>
+      </p:pic>
+      <p:sp>
+        <p:nvSpPr>
+          <p:cNvPr id="4" name="Content Placeholder 3"/>
+          <p:cNvSpPr>
+            <a:spLocks noGrp="1"/>
+          </p:cNvSpPr>
+          <p:nvPr>
+            <p:ph sz="quarter" idx="14"/>
+          </p:nvPr>
+        </p:nvSpPr>
+        <p:spPr/>
+        <p:txBody>
+          <a:bodyPr/>
+          <a:lstStyle/>
+          <a:p>
+            <a:r>
+              <a:rPr lang="en-US" dirty="0" smtClean="0"/>
+              <a:t>Helpful for visually showing color relationships</a:t>
+            </a:r>
+          </a:p>
+          <a:p>
+            <a:r>
+              <a:rPr lang="en-US" dirty="0" smtClean="0"/>
+              <a:t>Complementary colors live across</a:t>
+            </a:r>
+            <a:endParaRPr lang="en-US" dirty="0"/>
+          </a:p>
+        </p:txBody>
+      </p:sp>
+    </p:spTree>
+    <p:extLst>
+      <p:ext uri="{BB962C8B-B14F-4D97-AF65-F5344CB8AC3E}">
+        <p14:creationId xmlns:p14="http://schemas.microsoft.com/office/powerpoint/2010/main" val="4037412911"/>
+      </p:ext>
+    </p:extLst>
+  </p:cSld>
+  <p:clrMapOvr>
+    <a:masterClrMapping/>
+  </p:clrMapOvr>
+</p:sld>
+</file>
+
+<file path=ppt/slides/slide13.xml><?xml version="1.0" encoding="utf-8"?>
+<p:sld xmlns:a="http://schemas.openxmlformats.org/drawingml/2006/main" xmlns:r="http://schemas.openxmlformats.org/officeDocument/2006/relationships" xmlns:p="http://schemas.openxmlformats.org/presentationml/2006/main">
+  <p:cSld>
+    <p:spTree>
+      <p:nvGrpSpPr>
+        <p:cNvPr id="1" name=""/>
+        <p:cNvGrpSpPr/>
+        <p:nvPr/>
+      </p:nvGrpSpPr>
+      <p:grpSpPr>
+        <a:xfrm>
+          <a:off x="0" y="0"/>
+          <a:ext cx="0" cy="0"/>
+          <a:chOff x="0" y="0"/>
+          <a:chExt cx="0" cy="0"/>
+        </a:xfrm>
+      </p:grpSpPr>
+      <p:sp>
+        <p:nvSpPr>
+          <p:cNvPr id="2" name="Title 1"/>
+          <p:cNvSpPr>
+            <a:spLocks noGrp="1"/>
+          </p:cNvSpPr>
+          <p:nvPr>
+            <p:ph type="title"/>
+          </p:nvPr>
+        </p:nvSpPr>
+        <p:spPr/>
+        <p:txBody>
+          <a:bodyPr/>
+          <a:lstStyle/>
+          <a:p>
+            <a:r>
+              <a:rPr lang="en-US" dirty="0" smtClean="0"/>
+              <a:t>Digital Color Wheel</a:t>
+            </a:r>
+            <a:endParaRPr lang="en-US" dirty="0"/>
+          </a:p>
+        </p:txBody>
+      </p:sp>
+      <p:pic>
+        <p:nvPicPr>
+          <p:cNvPr id="5" name="Content Placeholder 4" descr="kuler.jpg"/>
+          <p:cNvPicPr>
+            <a:picLocks noGrp="1" noChangeAspect="1"/>
+          </p:cNvPicPr>
+          <p:nvPr>
+            <p:ph sz="quarter" idx="13"/>
+          </p:nvPr>
+        </p:nvPicPr>
+        <p:blipFill rotWithShape="1">
+          <a:blip r:embed="rId2">
+            <a:extLst>
+              <a:ext uri="{28A0092B-C50C-407E-A947-70E740481C1C}">
+                <a14:useLocalDpi xmlns:a14="http://schemas.microsoft.com/office/drawing/2010/main" val="0"/>
+              </a:ext>
+            </a:extLst>
+          </a:blip>
+          <a:srcRect l="14219" t="-11" r="32741" b="11"/>
+          <a:stretch/>
+        </p:blipFill>
+        <p:spPr/>
+      </p:pic>
+      <p:sp>
+        <p:nvSpPr>
+          <p:cNvPr id="4" name="Content Placeholder 3"/>
+          <p:cNvSpPr>
+            <a:spLocks noGrp="1"/>
+          </p:cNvSpPr>
+          <p:nvPr>
+            <p:ph sz="quarter" idx="14"/>
+          </p:nvPr>
+        </p:nvSpPr>
+        <p:spPr/>
+        <p:txBody>
+          <a:bodyPr/>
+          <a:lstStyle/>
+          <a:p>
+            <a:r>
+              <a:rPr lang="en-US" dirty="0" smtClean="0">
+                <a:hlinkClick r:id="rId3"/>
+              </a:rPr>
+              <a:t>http://colorschemedesigner.com/</a:t>
+            </a:r>
+            <a:endParaRPr lang="en-US" dirty="0" smtClean="0"/>
+          </a:p>
+          <a:p>
+            <a:r>
+              <a:rPr lang="en-US" dirty="0" smtClean="0">
+                <a:hlinkClick r:id="rId4"/>
+              </a:rPr>
+              <a:t>http://kuler.adobe.com/</a:t>
+            </a:r>
+            <a:endParaRPr lang="en-US" dirty="0"/>
+          </a:p>
+        </p:txBody>
+      </p:sp>
+    </p:spTree>
+    <p:extLst>
+      <p:ext uri="{BB962C8B-B14F-4D97-AF65-F5344CB8AC3E}">
+        <p14:creationId xmlns:p14="http://schemas.microsoft.com/office/powerpoint/2010/main" val="1161149619"/>
+      </p:ext>
+    </p:extLst>
+  </p:cSld>
+  <p:clrMapOvr>
+    <a:masterClrMapping/>
+  </p:clrMapOvr>
+</p:sld>
+</file>
+
+<file path=ppt/slides/slide14.xml><?xml version="1.0" encoding="utf-8"?>
+<p:sld xmlns:a="http://schemas.openxmlformats.org/drawingml/2006/main" xmlns:r="http://schemas.openxmlformats.org/officeDocument/2006/relationships" xmlns:p="http://schemas.openxmlformats.org/presentationml/2006/main">
+  <p:cSld>
+    <p:spTree>
+      <p:nvGrpSpPr>
+        <p:cNvPr id="1" name=""/>
+        <p:cNvGrpSpPr/>
+        <p:nvPr/>
+      </p:nvGrpSpPr>
+      <p:grpSpPr>
+        <a:xfrm>
+          <a:off x="0" y="0"/>
+          <a:ext cx="0" cy="0"/>
+          <a:chOff x="0" y="0"/>
+          <a:chExt cx="0" cy="0"/>
+        </a:xfrm>
+      </p:grpSpPr>
+      <p:sp>
+        <p:nvSpPr>
+          <p:cNvPr id="2" name="Title 1"/>
+          <p:cNvSpPr>
+            <a:spLocks noGrp="1"/>
+          </p:cNvSpPr>
+          <p:nvPr>
+            <p:ph type="title"/>
+          </p:nvPr>
+        </p:nvSpPr>
+        <p:spPr/>
+        <p:txBody>
+          <a:bodyPr/>
+          <a:lstStyle/>
+          <a:p>
+            <a:r>
+              <a:rPr lang="en-US" dirty="0" smtClean="0"/>
+              <a:t>Color schemes</a:t>
+            </a:r>
+            <a:endParaRPr lang="en-US" dirty="0"/>
+          </a:p>
+        </p:txBody>
+      </p:sp>
+      <p:pic>
+        <p:nvPicPr>
+          <p:cNvPr id="5" name="Content Placeholder 4"/>
+          <p:cNvPicPr>
+            <a:picLocks noGrp="1" noChangeAspect="1"/>
+          </p:cNvPicPr>
+          <p:nvPr>
+            <p:ph sz="quarter" idx="13"/>
+          </p:nvPr>
+        </p:nvPicPr>
+        <p:blipFill rotWithShape="1">
+          <a:blip r:embed="rId3"/>
+          <a:srcRect t="4500" b="11050"/>
+          <a:stretch/>
+        </p:blipFill>
+        <p:spPr/>
+      </p:pic>
+      <p:sp>
+        <p:nvSpPr>
+          <p:cNvPr id="4" name="Content Placeholder 3"/>
+          <p:cNvSpPr>
+            <a:spLocks noGrp="1"/>
+          </p:cNvSpPr>
+          <p:nvPr>
+            <p:ph sz="quarter" idx="14"/>
+          </p:nvPr>
+        </p:nvSpPr>
+        <p:spPr/>
+        <p:txBody>
+          <a:bodyPr/>
+          <a:lstStyle/>
+          <a:p>
+            <a:r>
+              <a:rPr lang="en-US" dirty="0" smtClean="0"/>
+              <a:t>A grouping of colors that go well together</a:t>
+            </a:r>
+          </a:p>
+          <a:p>
+            <a:r>
+              <a:rPr lang="en-US" dirty="0" smtClean="0"/>
+              <a:t>Start with a base color</a:t>
+            </a:r>
+          </a:p>
+          <a:p>
+            <a:r>
+              <a:rPr lang="en-US" dirty="0" smtClean="0"/>
+              <a:t>Pick other colors using a certain scheme or pattern</a:t>
+            </a:r>
+          </a:p>
+        </p:txBody>
+      </p:sp>
+    </p:spTree>
+    <p:extLst>
+      <p:ext uri="{BB962C8B-B14F-4D97-AF65-F5344CB8AC3E}">
+        <p14:creationId xmlns:p14="http://schemas.microsoft.com/office/powerpoint/2010/main" val="1610611244"/>
+      </p:ext>
+    </p:extLst>
+  </p:cSld>
+  <p:clrMapOvr>
+    <a:masterClrMapping/>
+  </p:clrMapOvr>
+</p:sld>
+</file>
+
+<file path=ppt/slides/slide15.xml><?xml version="1.0" encoding="utf-8"?>
+<p:sld xmlns:a="http://schemas.openxmlformats.org/drawingml/2006/main" xmlns:r="http://schemas.openxmlformats.org/officeDocument/2006/relationships" xmlns:p="http://schemas.openxmlformats.org/presentationml/2006/main">
+  <p:cSld>
+    <p:spTree>
+      <p:nvGrpSpPr>
+        <p:cNvPr id="1" name=""/>
+        <p:cNvGrpSpPr/>
+        <p:nvPr/>
+      </p:nvGrpSpPr>
+      <p:grpSpPr>
+        <a:xfrm>
+          <a:off x="0" y="0"/>
+          <a:ext cx="0" cy="0"/>
+          <a:chOff x="0" y="0"/>
+          <a:chExt cx="0" cy="0"/>
+        </a:xfrm>
+      </p:grpSpPr>
+      <p:sp>
+        <p:nvSpPr>
+          <p:cNvPr id="2" name="Title 1"/>
+          <p:cNvSpPr>
+            <a:spLocks noGrp="1"/>
+          </p:cNvSpPr>
+          <p:nvPr>
+            <p:ph type="title"/>
+          </p:nvPr>
+        </p:nvSpPr>
+        <p:spPr/>
+        <p:txBody>
+          <a:bodyPr/>
+          <a:lstStyle/>
+          <a:p>
+            <a:r>
+              <a:rPr lang="en-US" dirty="0" smtClean="0"/>
+              <a:t>Triadic</a:t>
+            </a:r>
+            <a:endParaRPr lang="en-US" dirty="0"/>
+          </a:p>
+        </p:txBody>
+      </p:sp>
+      <p:sp>
+        <p:nvSpPr>
+          <p:cNvPr id="4" name="Content Placeholder 3"/>
+          <p:cNvSpPr>
+            <a:spLocks noGrp="1"/>
+          </p:cNvSpPr>
+          <p:nvPr>
+            <p:ph sz="quarter" idx="14"/>
+          </p:nvPr>
+        </p:nvSpPr>
+        <p:spPr/>
+        <p:txBody>
+          <a:bodyPr/>
+          <a:lstStyle/>
+          <a:p>
+            <a:r>
+              <a:rPr lang="en-US" dirty="0" smtClean="0"/>
+              <a:t>Three colors</a:t>
+            </a:r>
+          </a:p>
+          <a:p>
+            <a:r>
+              <a:rPr lang="en-US" dirty="0" smtClean="0"/>
+              <a:t>Additional colors equally spaced from base color</a:t>
+            </a:r>
+            <a:endParaRPr lang="en-US" dirty="0"/>
+          </a:p>
+        </p:txBody>
+      </p:sp>
+      <p:pic>
+        <p:nvPicPr>
+          <p:cNvPr id="8" name="Content Placeholder 7" descr="Head_First_Web_Design.pdf (page 205 of 497)-2.jpg"/>
+          <p:cNvPicPr>
+            <a:picLocks noGrp="1" noChangeAspect="1"/>
+          </p:cNvPicPr>
+          <p:nvPr>
+            <p:ph sz="quarter" idx="13"/>
+          </p:nvPr>
+        </p:nvPicPr>
+        <p:blipFill>
+          <a:blip r:embed="rId2">
+            <a:extLst>
+              <a:ext uri="{28A0092B-C50C-407E-A947-70E740481C1C}">
+                <a14:useLocalDpi xmlns:a14="http://schemas.microsoft.com/office/drawing/2010/main" val="0"/>
+              </a:ext>
+            </a:extLst>
+          </a:blip>
+          <a:srcRect t="-47501" b="-47501"/>
+          <a:stretch>
+            <a:fillRect/>
+          </a:stretch>
+        </p:blipFill>
+        <p:spPr>
+          <a:xfrm>
+            <a:off x="1298575" y="2120900"/>
+            <a:ext cx="3200400" cy="3603625"/>
+          </a:xfrm>
+        </p:spPr>
+      </p:pic>
+    </p:spTree>
+    <p:extLst>
+      <p:ext uri="{BB962C8B-B14F-4D97-AF65-F5344CB8AC3E}">
+        <p14:creationId xmlns:p14="http://schemas.microsoft.com/office/powerpoint/2010/main" val="806465571"/>
+      </p:ext>
+    </p:extLst>
+  </p:cSld>
+  <p:clrMapOvr>
+    <a:masterClrMapping/>
+  </p:clrMapOvr>
+</p:sld>
+</file>
+
+<file path=ppt/slides/slide16.xml><?xml version="1.0" encoding="utf-8"?>
+<p:sld xmlns:a="http://schemas.openxmlformats.org/drawingml/2006/main" xmlns:r="http://schemas.openxmlformats.org/officeDocument/2006/relationships" xmlns:p="http://schemas.openxmlformats.org/presentationml/2006/main">
+  <p:cSld>
+    <p:spTree>
+      <p:nvGrpSpPr>
+        <p:cNvPr id="1" name=""/>
+        <p:cNvGrpSpPr/>
+        <p:nvPr/>
+      </p:nvGrpSpPr>
+      <p:grpSpPr>
+        <a:xfrm>
+          <a:off x="0" y="0"/>
+          <a:ext cx="0" cy="0"/>
+          <a:chOff x="0" y="0"/>
+          <a:chExt cx="0" cy="0"/>
+        </a:xfrm>
+      </p:grpSpPr>
+      <p:sp>
+        <p:nvSpPr>
+          <p:cNvPr id="2" name="Title 1"/>
+          <p:cNvSpPr>
+            <a:spLocks noGrp="1"/>
+          </p:cNvSpPr>
+          <p:nvPr>
+            <p:ph type="title"/>
+          </p:nvPr>
+        </p:nvSpPr>
+        <p:spPr/>
+        <p:txBody>
+          <a:bodyPr/>
+          <a:lstStyle/>
+          <a:p>
+            <a:r>
+              <a:rPr lang="en-US" dirty="0" err="1" smtClean="0"/>
+              <a:t>Tetradic</a:t>
+            </a:r>
+            <a:endParaRPr lang="en-US" dirty="0"/>
+          </a:p>
+        </p:txBody>
+      </p:sp>
+      <p:pic>
+        <p:nvPicPr>
+          <p:cNvPr id="5" name="Content Placeholder 4" descr="Head_First_Web_Design.pdf (page 216 of 497).jpg"/>
+          <p:cNvPicPr>
+            <a:picLocks noGrp="1" noChangeAspect="1"/>
+          </p:cNvPicPr>
+          <p:nvPr>
+            <p:ph sz="quarter" idx="13"/>
+          </p:nvPr>
+        </p:nvPicPr>
+        <p:blipFill>
+          <a:blip r:embed="rId2">
+            <a:extLst>
+              <a:ext uri="{28A0092B-C50C-407E-A947-70E740481C1C}">
+                <a14:useLocalDpi xmlns:a14="http://schemas.microsoft.com/office/drawing/2010/main" val="0"/>
+              </a:ext>
+            </a:extLst>
+          </a:blip>
+          <a:srcRect t="-6012" b="-6012"/>
+          <a:stretch>
+            <a:fillRect/>
+          </a:stretch>
+        </p:blipFill>
+        <p:spPr/>
+      </p:pic>
+      <p:sp>
+        <p:nvSpPr>
+          <p:cNvPr id="4" name="Content Placeholder 3"/>
+          <p:cNvSpPr>
+            <a:spLocks noGrp="1"/>
+          </p:cNvSpPr>
+          <p:nvPr>
+            <p:ph sz="quarter" idx="14"/>
+          </p:nvPr>
+        </p:nvSpPr>
+        <p:spPr/>
+        <p:txBody>
+          <a:bodyPr/>
+          <a:lstStyle/>
+          <a:p>
+            <a:r>
+              <a:rPr lang="en-US" dirty="0" smtClean="0"/>
+              <a:t>Four colors</a:t>
+            </a:r>
+          </a:p>
+          <a:p>
+            <a:r>
+              <a:rPr lang="en-US" dirty="0" smtClean="0"/>
+              <a:t>AKA double complementary scheme</a:t>
+            </a:r>
+            <a:endParaRPr lang="en-US" dirty="0"/>
+          </a:p>
+          <a:p>
+            <a:r>
+              <a:rPr lang="en-US" dirty="0" smtClean="0"/>
+              <a:t>2 pairs of colors about 20° apart</a:t>
+            </a:r>
+          </a:p>
+        </p:txBody>
+      </p:sp>
+    </p:spTree>
+    <p:extLst>
+      <p:ext uri="{BB962C8B-B14F-4D97-AF65-F5344CB8AC3E}">
+        <p14:creationId xmlns:p14="http://schemas.microsoft.com/office/powerpoint/2010/main" val="210069874"/>
+      </p:ext>
+    </p:extLst>
+  </p:cSld>
+  <p:clrMapOvr>
+    <a:masterClrMapping/>
+  </p:clrMapOvr>
+</p:sld>
+</file>
+
+<file path=ppt/slides/slide17.xml><?xml version="1.0" encoding="utf-8"?>
+<p:sld xmlns:a="http://schemas.openxmlformats.org/drawingml/2006/main" xmlns:r="http://schemas.openxmlformats.org/officeDocument/2006/relationships" xmlns:p="http://schemas.openxmlformats.org/presentationml/2006/main">
+  <p:cSld>
+    <p:spTree>
+      <p:nvGrpSpPr>
+        <p:cNvPr id="1" name=""/>
+        <p:cNvGrpSpPr/>
+        <p:nvPr/>
+      </p:nvGrpSpPr>
+      <p:grpSpPr>
+        <a:xfrm>
+          <a:off x="0" y="0"/>
+          <a:ext cx="0" cy="0"/>
+          <a:chOff x="0" y="0"/>
+          <a:chExt cx="0" cy="0"/>
+        </a:xfrm>
+      </p:grpSpPr>
+      <p:sp>
+        <p:nvSpPr>
+          <p:cNvPr id="2" name="Title 1"/>
+          <p:cNvSpPr>
+            <a:spLocks noGrp="1"/>
+          </p:cNvSpPr>
+          <p:nvPr>
+            <p:ph type="title"/>
+          </p:nvPr>
+        </p:nvSpPr>
+        <p:spPr/>
+        <p:txBody>
+          <a:bodyPr/>
+          <a:lstStyle/>
+          <a:p>
+            <a:r>
+              <a:rPr lang="en-US" dirty="0" smtClean="0"/>
+              <a:t>The Rules</a:t>
+            </a:r>
+            <a:endParaRPr lang="en-US" dirty="0"/>
+          </a:p>
+        </p:txBody>
+      </p:sp>
+      <p:pic>
+        <p:nvPicPr>
+          <p:cNvPr id="5" name="Content Placeholder 4"/>
+          <p:cNvPicPr>
+            <a:picLocks noGrp="1" noChangeAspect="1"/>
+          </p:cNvPicPr>
+          <p:nvPr>
+            <p:ph sz="quarter" idx="13"/>
+          </p:nvPr>
+        </p:nvPicPr>
+        <p:blipFill rotWithShape="1">
+          <a:blip r:embed="rId3"/>
+          <a:srcRect l="24670" t="-11" r="8722" b="11"/>
+          <a:stretch/>
+        </p:blipFill>
+        <p:spPr/>
+      </p:pic>
+      <p:sp>
+        <p:nvSpPr>
+          <p:cNvPr id="4" name="Content Placeholder 3"/>
+          <p:cNvSpPr>
+            <a:spLocks noGrp="1"/>
+          </p:cNvSpPr>
+          <p:nvPr>
+            <p:ph sz="quarter" idx="14"/>
+          </p:nvPr>
+        </p:nvSpPr>
+        <p:spPr/>
+        <p:txBody>
+          <a:bodyPr/>
+          <a:lstStyle/>
+          <a:p>
+            <a:r>
+              <a:rPr lang="en-US" dirty="0" smtClean="0"/>
+              <a:t>There are no rules</a:t>
+            </a:r>
+          </a:p>
+          <a:p>
+            <a:r>
+              <a:rPr lang="en-US" dirty="0" smtClean="0"/>
+              <a:t>Create contrast</a:t>
+            </a:r>
+          </a:p>
+          <a:p>
+            <a:r>
+              <a:rPr lang="en-US" dirty="0" smtClean="0"/>
+              <a:t>Use dominant colors to emphasize</a:t>
+            </a:r>
+            <a:endParaRPr lang="en-US" dirty="0"/>
+          </a:p>
+        </p:txBody>
+      </p:sp>
+    </p:spTree>
+    <p:extLst>
+      <p:ext uri="{BB962C8B-B14F-4D97-AF65-F5344CB8AC3E}">
+        <p14:creationId xmlns:p14="http://schemas.microsoft.com/office/powerpoint/2010/main" val="3473236145"/>
+      </p:ext>
+    </p:extLst>
+  </p:cSld>
+  <p:clrMapOvr>
+    <a:masterClrMapping/>
+  </p:clrMapOvr>
+</p:sld>
+</file>
+
+<file path=ppt/slides/slide18.xml><?xml version="1.0" encoding="utf-8"?>
+<p:sld xmlns:a="http://schemas.openxmlformats.org/drawingml/2006/main" xmlns:r="http://schemas.openxmlformats.org/officeDocument/2006/relationships" xmlns:p="http://schemas.openxmlformats.org/presentationml/2006/main">
+  <p:cSld>
+    <p:spTree>
+      <p:nvGrpSpPr>
+        <p:cNvPr id="1" name=""/>
+        <p:cNvGrpSpPr/>
+        <p:nvPr/>
+      </p:nvGrpSpPr>
+      <p:grpSpPr>
+        <a:xfrm>
+          <a:off x="0" y="0"/>
+          <a:ext cx="0" cy="0"/>
+          <a:chOff x="0" y="0"/>
+          <a:chExt cx="0" cy="0"/>
+        </a:xfrm>
+      </p:grpSpPr>
+      <p:sp>
+        <p:nvSpPr>
+          <p:cNvPr id="9" name="Title 8"/>
+          <p:cNvSpPr>
+            <a:spLocks noGrp="1"/>
+          </p:cNvSpPr>
+          <p:nvPr>
+            <p:ph type="title"/>
+          </p:nvPr>
+        </p:nvSpPr>
+        <p:spPr/>
+        <p:txBody>
+          <a:bodyPr/>
+          <a:lstStyle/>
+          <a:p>
+            <a:r>
+              <a:rPr lang="en-US" dirty="0" smtClean="0"/>
+              <a:t>Class Ten</a:t>
+            </a:r>
+            <a:endParaRPr lang="en-US" dirty="0"/>
+          </a:p>
+        </p:txBody>
+      </p:sp>
+      <p:sp>
+        <p:nvSpPr>
+          <p:cNvPr id="10" name="Text Placeholder 9"/>
+          <p:cNvSpPr>
+            <a:spLocks noGrp="1"/>
+          </p:cNvSpPr>
+          <p:nvPr>
+            <p:ph type="body" idx="1"/>
+          </p:nvPr>
+        </p:nvSpPr>
+        <p:spPr/>
+        <p:txBody>
+          <a:bodyPr/>
+          <a:lstStyle/>
+          <a:p>
+            <a:r>
+              <a:rPr lang="en-US" dirty="0" smtClean="0"/>
+              <a:t>Smart Navigation</a:t>
+            </a:r>
+            <a:endParaRPr lang="en-US" dirty="0"/>
+          </a:p>
+        </p:txBody>
+      </p:sp>
+    </p:spTree>
+    <p:extLst>
+      <p:ext uri="{BB962C8B-B14F-4D97-AF65-F5344CB8AC3E}">
+        <p14:creationId xmlns:p14="http://schemas.microsoft.com/office/powerpoint/2010/main" val="472547524"/>
       </p:ext>
     </p:extLst>
   </p:cSld>
@@ -6258,6 +7697,16 @@
             <a:r>
               <a:rPr lang="en-US" dirty="0" smtClean="0"/>
               <a:t>Autopsy</a:t>
+            </a:r>
+          </a:p>
+          <a:p>
+            <a:pPr>
+              <a:buFont typeface="Wingdings" charset="2"/>
+              <a:buChar char="v"/>
+            </a:pPr>
+            <a:r>
+              <a:rPr lang="en-US" dirty="0" smtClean="0"/>
+              <a:t>Guest Speaker</a:t>
             </a:r>
             <a:endParaRPr lang="en-US" dirty="0"/>
           </a:p>
@@ -6349,7 +7798,28 @@
           <a:bodyPr/>
           <a:lstStyle/>
           <a:p>
-            <a:endParaRPr lang="en-US" dirty="0" smtClean="0"/>
+            <a:r>
+              <a:rPr lang="en-US" dirty="0" err="1" smtClean="0"/>
+              <a:t>Kamie</a:t>
+            </a:r>
+            <a:r>
+              <a:rPr lang="en-US" dirty="0" smtClean="0"/>
+              <a:t> was the only vote, so she has decided the fate of the class slides</a:t>
+            </a:r>
+          </a:p>
+          <a:p>
+            <a:pPr lvl="1"/>
+            <a:r>
+              <a:rPr lang="en-US" dirty="0" smtClean="0"/>
+              <a:t>Slides will be a hybrid</a:t>
+            </a:r>
+          </a:p>
+          <a:p>
+            <a:pPr lvl="1"/>
+            <a:r>
+              <a:rPr lang="en-US" dirty="0" smtClean="0"/>
+              <a:t>Class will have more "lab" time</a:t>
+            </a:r>
           </a:p>
         </p:txBody>
       </p:sp>
@@ -6486,7 +7956,7 @@
         <p:spPr/>
         <p:txBody>
           <a:bodyPr>
-            <a:normAutofit/>
+            <a:normAutofit lnSpcReduction="10000"/>
           </a:bodyPr>
           <a:lstStyle/>
           <a:p>
@@ -6494,8 +7964,76 @@
               <a:rPr lang="en-US" dirty="0" smtClean="0">
                 <a:hlinkClick r:id="rId3"/>
               </a:rPr>
-              <a:t>http://www.timtebow.com/</a:t>
-            </a:r>
+              <a:t>http://www.ohmycupcakes.com/</a:t>
+            </a:r>
+            <a:endParaRPr lang="en-US" dirty="0" smtClean="0"/>
+          </a:p>
+          <a:p>
+            <a:r>
+              <a:rPr lang="en-US" dirty="0" smtClean="0">
+                <a:hlinkClick r:id="rId4"/>
+              </a:rPr>
+              <a:t>http://spacecollective.org/projects/The-great-enhancement-debate</a:t>
+            </a:r>
+            <a:endParaRPr lang="en-US" dirty="0" smtClean="0"/>
+          </a:p>
+          <a:p>
+            <a:r>
+              <a:rPr lang="en-US" dirty="0" smtClean="0">
+                <a:hlinkClick r:id="rId5"/>
+              </a:rPr>
+              <a:t>http://google.com</a:t>
+            </a:r>
+            <a:endParaRPr lang="en-US" dirty="0" smtClean="0"/>
+          </a:p>
+          <a:p>
+            <a:pPr lvl="1"/>
+            <a:r>
+              <a:rPr lang="en-US" dirty="0" smtClean="0"/>
+              <a:t>"do a barrel roll"</a:t>
+            </a:r>
+          </a:p>
+          <a:p>
+            <a:pPr lvl="1"/>
+            <a:r>
+              <a:rPr lang="en-US" dirty="0" smtClean="0"/>
+              <a:t>"askew"</a:t>
+            </a:r>
+          </a:p>
+          <a:p>
+            <a:r>
+              <a:rPr lang="en-US" dirty="0">
+                <a:hlinkClick r:id="rId6"/>
+              </a:rPr>
+              <a:t>http://www.google.com/</a:t>
+            </a:r>
+            <a:r>
+              <a:rPr lang="en-US" dirty="0" smtClean="0">
+                <a:hlinkClick r:id="rId6"/>
+              </a:rPr>
+              <a:t>language_tools</a:t>
+            </a:r>
+            <a:endParaRPr lang="en-US" dirty="0" smtClean="0"/>
+          </a:p>
+          <a:p>
+            <a:r>
+              <a:rPr lang="en-US" dirty="0">
+                <a:hlinkClick r:id="rId7"/>
+              </a:rPr>
+              <a:t>http://en.wikipedia.org/wiki/Google%27s_hoaxes#</a:t>
+            </a:r>
+            <a:r>
+              <a:rPr lang="en-US" dirty="0" smtClean="0">
+                <a:hlinkClick r:id="rId7"/>
+              </a:rPr>
+              <a:t>Easter_eggs</a:t>
+            </a:r>
+            <a:endParaRPr lang="en-US" dirty="0" smtClean="0"/>
+          </a:p>
+          <a:p>
+            <a:endParaRPr lang="en-US" dirty="0" smtClean="0"/>
+          </a:p>
+          <a:p>
             <a:endParaRPr lang="en-US" dirty="0"/>
           </a:p>
         </p:txBody>
@@ -6618,7 +8156,7 @@
       </p:grpSpPr>
       <p:sp>
         <p:nvSpPr>
-          <p:cNvPr id="2" name="Title 1"/>
+          <p:cNvPr id="5" name="Title 4"/>
           <p:cNvSpPr>
             <a:spLocks noGrp="1"/>
           </p:cNvSpPr>
@@ -6633,73 +8171,22 @@
           <a:p>
             <a:r>
               <a:rPr lang="en-US" dirty="0" smtClean="0"/>
-              <a:t>The Chapter</a:t>
+              <a:t>Guest Speaker</a:t>
             </a:r>
             <a:endParaRPr lang="en-US" dirty="0"/>
-          </a:p>
-        </p:txBody>
-      </p:sp>
-      <p:sp>
-        <p:nvSpPr>
-          <p:cNvPr id="3" name="Content Placeholder 2"/>
-          <p:cNvSpPr>
-            <a:spLocks noGrp="1"/>
-          </p:cNvSpPr>
-          <p:nvPr>
-            <p:ph sz="quarter" idx="13"/>
-          </p:nvPr>
-        </p:nvSpPr>
-        <p:spPr/>
-        <p:txBody>
-          <a:bodyPr/>
-          <a:lstStyle/>
-          <a:p>
-            <a:pPr marL="0" indent="0">
-              <a:buNone/>
-            </a:pPr>
-            <a:endParaRPr lang="en-US" dirty="0" smtClean="0"/>
-          </a:p>
-        </p:txBody>
-      </p:sp>
-      <p:sp>
-        <p:nvSpPr>
-          <p:cNvPr id="4" name="Content Placeholder 3"/>
-          <p:cNvSpPr>
-            <a:spLocks noGrp="1"/>
-          </p:cNvSpPr>
-          <p:nvPr>
-            <p:ph sz="quarter" idx="14"/>
-          </p:nvPr>
-        </p:nvSpPr>
-        <p:spPr/>
-        <p:txBody>
-          <a:bodyPr/>
-          <a:lstStyle/>
-          <a:p>
-            <a:pPr marL="0" indent="0">
-              <a:buNone/>
-            </a:pPr>
-            <a:endParaRPr lang="en-US" dirty="0" smtClean="0"/>
           </a:p>
         </p:txBody>
       </p:sp>
     </p:spTree>
     <p:extLst>
       <p:ext uri="{BB962C8B-B14F-4D97-AF65-F5344CB8AC3E}">
-        <p14:creationId xmlns:p14="http://schemas.microsoft.com/office/powerpoint/2010/main" val="3633167769"/>
+        <p14:creationId xmlns:p14="http://schemas.microsoft.com/office/powerpoint/2010/main" val="4168028246"/>
       </p:ext>
     </p:extLst>
   </p:cSld>
   <p:clrMapOvr>
     <a:masterClrMapping/>
   </p:clrMapOvr>
-  <p:timing>
-    <p:tnLst>
-      <p:par>
-        <p:cTn xmlns:p14="http://schemas.microsoft.com/office/powerpoint/2010/main" id="1" dur="indefinite" restart="never" nodeType="tmRoot"/>
-      </p:par>
-    </p:tnLst>
-  </p:timing>
 </p:sld>
 </file>
 
@@ -6722,7 +8209,7 @@
       </p:grpSpPr>
       <p:sp>
         <p:nvSpPr>
-          <p:cNvPr id="9" name="Title 8"/>
+          <p:cNvPr id="3" name="Title 2"/>
           <p:cNvSpPr>
             <a:spLocks noGrp="1"/>
           </p:cNvSpPr>
@@ -6737,11 +8224,7 @@
           <a:p>
             <a:r>
               <a:rPr lang="en-US" dirty="0" smtClean="0"/>
-              <a:t>Class </a:t>
-            </a:r>
-            <a:r>
-              <a:rPr lang="en-US" dirty="0" smtClean="0"/>
-              <a:t>Eleven</a:t>
+              <a:t>Break</a:t>
             </a:r>
             <a:endParaRPr lang="en-US" dirty="0"/>
           </a:p>
@@ -6749,7 +8232,7 @@
       </p:sp>
       <p:sp>
         <p:nvSpPr>
-          <p:cNvPr id="10" name="Text Placeholder 9"/>
+          <p:cNvPr id="4" name="Text Placeholder 3"/>
           <p:cNvSpPr>
             <a:spLocks noGrp="1"/>
           </p:cNvSpPr>
@@ -6762,14 +8245,118 @@
           <a:bodyPr/>
           <a:lstStyle/>
           <a:p>
-            <a:endParaRPr lang="en-US" dirty="0"/>
+            <a:endParaRPr lang="en-US"/>
           </a:p>
         </p:txBody>
       </p:sp>
     </p:spTree>
     <p:extLst>
       <p:ext uri="{BB962C8B-B14F-4D97-AF65-F5344CB8AC3E}">
-        <p14:creationId xmlns:p14="http://schemas.microsoft.com/office/powerpoint/2010/main" val="472547524"/>
+        <p14:creationId xmlns:p14="http://schemas.microsoft.com/office/powerpoint/2010/main" val="733503261"/>
+      </p:ext>
+    </p:extLst>
+  </p:cSld>
+  <p:clrMapOvr>
+    <a:masterClrMapping/>
+  </p:clrMapOvr>
+  <p:timing>
+    <p:tnLst>
+      <p:par>
+        <p:cTn xmlns:p14="http://schemas.microsoft.com/office/powerpoint/2010/main" id="1" dur="indefinite" restart="never" nodeType="tmRoot"/>
+      </p:par>
+    </p:tnLst>
+  </p:timing>
+</p:sld>
+</file>
+
+<file path=ppt/slides/slide9.xml><?xml version="1.0" encoding="utf-8"?>
+<p:sld xmlns:a="http://schemas.openxmlformats.org/drawingml/2006/main" xmlns:r="http://schemas.openxmlformats.org/officeDocument/2006/relationships" xmlns:p="http://schemas.openxmlformats.org/presentationml/2006/main">
+  <p:cSld>
+    <p:spTree>
+      <p:nvGrpSpPr>
+        <p:cNvPr id="1" name=""/>
+        <p:cNvGrpSpPr/>
+        <p:nvPr/>
+      </p:nvGrpSpPr>
+      <p:grpSpPr>
+        <a:xfrm>
+          <a:off x="0" y="0"/>
+          <a:ext cx="0" cy="0"/>
+          <a:chOff x="0" y="0"/>
+          <a:chExt cx="0" cy="0"/>
+        </a:xfrm>
+      </p:grpSpPr>
+      <p:sp>
+        <p:nvSpPr>
+          <p:cNvPr id="2" name="Title 1"/>
+          <p:cNvSpPr>
+            <a:spLocks noGrp="1"/>
+          </p:cNvSpPr>
+          <p:nvPr>
+            <p:ph type="title"/>
+          </p:nvPr>
+        </p:nvSpPr>
+        <p:spPr/>
+        <p:txBody>
+          <a:bodyPr/>
+          <a:lstStyle/>
+          <a:p>
+            <a:r>
+              <a:rPr lang="en-US" dirty="0" smtClean="0"/>
+              <a:t>The Chapter</a:t>
+            </a:r>
+            <a:endParaRPr lang="en-US" dirty="0"/>
+          </a:p>
+        </p:txBody>
+      </p:sp>
+      <p:sp>
+        <p:nvSpPr>
+          <p:cNvPr id="3" name="Content Placeholder 2"/>
+          <p:cNvSpPr>
+            <a:spLocks noGrp="1"/>
+          </p:cNvSpPr>
+          <p:nvPr>
+            <p:ph sz="quarter" idx="13"/>
+          </p:nvPr>
+        </p:nvSpPr>
+        <p:spPr/>
+        <p:txBody>
+          <a:bodyPr/>
+          <a:lstStyle/>
+          <a:p>
+            <a:pPr marL="0" indent="0">
+              <a:buNone/>
+            </a:pPr>
+            <a:endParaRPr lang="en-US" dirty="0" smtClean="0"/>
+          </a:p>
+        </p:txBody>
+      </p:sp>
+      <p:sp>
+        <p:nvSpPr>
+          <p:cNvPr id="4" name="Content Placeholder 3"/>
+          <p:cNvSpPr>
+            <a:spLocks noGrp="1"/>
+          </p:cNvSpPr>
+          <p:nvPr>
+            <p:ph sz="quarter" idx="14"/>
+          </p:nvPr>
+        </p:nvSpPr>
+        <p:spPr/>
+        <p:txBody>
+          <a:bodyPr/>
+          <a:lstStyle/>
+          <a:p>
+            <a:pPr marL="0" indent="0">
+              <a:buNone/>
+            </a:pPr>
+            <a:endParaRPr lang="en-US" dirty="0" smtClean="0"/>
+          </a:p>
+        </p:txBody>
+      </p:sp>
+    </p:spTree>
+    <p:extLst>
+      <p:ext uri="{BB962C8B-B14F-4D97-AF65-F5344CB8AC3E}">
+        <p14:creationId xmlns:p14="http://schemas.microsoft.com/office/powerpoint/2010/main" val="3633167769"/>
       </p:ext>
     </p:extLst>
   </p:cSld>

</xml_diff>